<commit_message>
- Upload to web is now async - Added Delete and Settings buttons, still not functional
</commit_message>
<xml_diff>
--- a/icons.pptx
+++ b/icons.pptx
@@ -393,7 +393,7 @@
           <a:p>
             <a:fld id="{66C146F3-39C6-485C-A277-E6065D3EE22B}" type="datetimeFigureOut">
               <a:rPr lang="en-US" smtClean="0"/>
-              <a:t>11/14/2018</a:t>
+              <a:t>12/3/2018</a:t>
             </a:fld>
             <a:endParaRPr lang="en-US"/>
           </a:p>
@@ -891,7 +891,7 @@
           <a:p>
             <a:fld id="{D3CBBCD6-EBAC-499F-8812-B7C958EFE341}" type="datetimeFigureOut">
               <a:rPr lang="en-US" smtClean="0"/>
-              <a:t>11/14/2018</a:t>
+              <a:t>12/3/2018</a:t>
             </a:fld>
             <a:endParaRPr lang="en-US"/>
           </a:p>
@@ -1089,7 +1089,7 @@
           <a:p>
             <a:fld id="{D3CBBCD6-EBAC-499F-8812-B7C958EFE341}" type="datetimeFigureOut">
               <a:rPr lang="en-US" smtClean="0"/>
-              <a:t>11/14/2018</a:t>
+              <a:t>12/3/2018</a:t>
             </a:fld>
             <a:endParaRPr lang="en-US"/>
           </a:p>
@@ -1297,7 +1297,7 @@
           <a:p>
             <a:fld id="{D3CBBCD6-EBAC-499F-8812-B7C958EFE341}" type="datetimeFigureOut">
               <a:rPr lang="en-US" smtClean="0"/>
-              <a:t>11/14/2018</a:t>
+              <a:t>12/3/2018</a:t>
             </a:fld>
             <a:endParaRPr lang="en-US"/>
           </a:p>
@@ -1495,7 +1495,7 @@
           <a:p>
             <a:fld id="{D3CBBCD6-EBAC-499F-8812-B7C958EFE341}" type="datetimeFigureOut">
               <a:rPr lang="en-US" smtClean="0"/>
-              <a:t>11/14/2018</a:t>
+              <a:t>12/3/2018</a:t>
             </a:fld>
             <a:endParaRPr lang="en-US"/>
           </a:p>
@@ -1770,7 +1770,7 @@
           <a:p>
             <a:fld id="{D3CBBCD6-EBAC-499F-8812-B7C958EFE341}" type="datetimeFigureOut">
               <a:rPr lang="en-US" smtClean="0"/>
-              <a:t>11/14/2018</a:t>
+              <a:t>12/3/2018</a:t>
             </a:fld>
             <a:endParaRPr lang="en-US"/>
           </a:p>
@@ -2035,7 +2035,7 @@
           <a:p>
             <a:fld id="{D3CBBCD6-EBAC-499F-8812-B7C958EFE341}" type="datetimeFigureOut">
               <a:rPr lang="en-US" smtClean="0"/>
-              <a:t>11/14/2018</a:t>
+              <a:t>12/3/2018</a:t>
             </a:fld>
             <a:endParaRPr lang="en-US"/>
           </a:p>
@@ -2447,7 +2447,7 @@
           <a:p>
             <a:fld id="{D3CBBCD6-EBAC-499F-8812-B7C958EFE341}" type="datetimeFigureOut">
               <a:rPr lang="en-US" smtClean="0"/>
-              <a:t>11/14/2018</a:t>
+              <a:t>12/3/2018</a:t>
             </a:fld>
             <a:endParaRPr lang="en-US"/>
           </a:p>
@@ -2588,7 +2588,7 @@
           <a:p>
             <a:fld id="{D3CBBCD6-EBAC-499F-8812-B7C958EFE341}" type="datetimeFigureOut">
               <a:rPr lang="en-US" smtClean="0"/>
-              <a:t>11/14/2018</a:t>
+              <a:t>12/3/2018</a:t>
             </a:fld>
             <a:endParaRPr lang="en-US"/>
           </a:p>
@@ -2701,7 +2701,7 @@
           <a:p>
             <a:fld id="{D3CBBCD6-EBAC-499F-8812-B7C958EFE341}" type="datetimeFigureOut">
               <a:rPr lang="en-US" smtClean="0"/>
-              <a:t>11/14/2018</a:t>
+              <a:t>12/3/2018</a:t>
             </a:fld>
             <a:endParaRPr lang="en-US"/>
           </a:p>
@@ -3012,7 +3012,7 @@
           <a:p>
             <a:fld id="{D3CBBCD6-EBAC-499F-8812-B7C958EFE341}" type="datetimeFigureOut">
               <a:rPr lang="en-US" smtClean="0"/>
-              <a:t>11/14/2018</a:t>
+              <a:t>12/3/2018</a:t>
             </a:fld>
             <a:endParaRPr lang="en-US"/>
           </a:p>
@@ -3300,7 +3300,7 @@
           <a:p>
             <a:fld id="{D3CBBCD6-EBAC-499F-8812-B7C958EFE341}" type="datetimeFigureOut">
               <a:rPr lang="en-US" smtClean="0"/>
-              <a:t>11/14/2018</a:t>
+              <a:t>12/3/2018</a:t>
             </a:fld>
             <a:endParaRPr lang="en-US"/>
           </a:p>
@@ -3541,7 +3541,7 @@
           <a:p>
             <a:fld id="{D3CBBCD6-EBAC-499F-8812-B7C958EFE341}" type="datetimeFigureOut">
               <a:rPr lang="en-US" smtClean="0"/>
-              <a:t>11/14/2018</a:t>
+              <a:t>12/3/2018</a:t>
             </a:fld>
             <a:endParaRPr lang="en-US"/>
           </a:p>
@@ -4412,7 +4412,7 @@
         </p:nvSpPr>
         <p:spPr>
           <a:xfrm>
-            <a:off x="8094579" y="2146670"/>
+            <a:off x="8092998" y="2137819"/>
             <a:ext cx="457202" cy="457202"/>
           </a:xfrm>
           <a:prstGeom prst="ellipse">
@@ -4432,6 +4432,404 @@
           </a:effectRef>
           <a:fontRef idx="minor">
             <a:schemeClr val="dk1"/>
+          </a:fontRef>
+        </p:style>
+        <p:txBody>
+          <a:bodyPr rtlCol="0" anchor="ctr"/>
+          <a:lstStyle/>
+          <a:p>
+            <a:pPr algn="ctr"/>
+            <a:endParaRPr lang="en-US"/>
+          </a:p>
+        </p:txBody>
+      </p:sp>
+      <p:sp>
+        <p:nvSpPr>
+          <p:cNvPr id="14" name="Rectangle 13">
+            <a:extLst>
+              <a:ext uri="{FF2B5EF4-FFF2-40B4-BE49-F238E27FC236}">
+                <a16:creationId xmlns:a16="http://schemas.microsoft.com/office/drawing/2014/main" id="{EE05AA1B-FB37-4BDD-99F4-BFF2E51060BD}"/>
+              </a:ext>
+            </a:extLst>
+          </p:cNvPr>
+          <p:cNvSpPr/>
+          <p:nvPr/>
+        </p:nvSpPr>
+        <p:spPr>
+          <a:xfrm>
+            <a:off x="2215115" y="4212187"/>
+            <a:ext cx="995519" cy="995519"/>
+          </a:xfrm>
+          <a:prstGeom prst="rect">
+            <a:avLst/>
+          </a:prstGeom>
+          <a:noFill/>
+          <a:ln w="28575">
+            <a:noFill/>
+          </a:ln>
+        </p:spPr>
+        <p:style>
+          <a:lnRef idx="2">
+            <a:schemeClr val="accent1">
+              <a:shade val="50000"/>
+            </a:schemeClr>
+          </a:lnRef>
+          <a:fillRef idx="1">
+            <a:schemeClr val="accent1"/>
+          </a:fillRef>
+          <a:effectRef idx="0">
+            <a:schemeClr val="accent1"/>
+          </a:effectRef>
+          <a:fontRef idx="minor">
+            <a:schemeClr val="lt1"/>
+          </a:fontRef>
+        </p:style>
+        <p:txBody>
+          <a:bodyPr rtlCol="0" anchor="ctr"/>
+          <a:lstStyle/>
+          <a:p>
+            <a:pPr algn="ctr"/>
+            <a:endParaRPr lang="en-US"/>
+          </a:p>
+        </p:txBody>
+      </p:sp>
+      <p:sp>
+        <p:nvSpPr>
+          <p:cNvPr id="15" name="Oval 14">
+            <a:extLst>
+              <a:ext uri="{FF2B5EF4-FFF2-40B4-BE49-F238E27FC236}">
+                <a16:creationId xmlns:a16="http://schemas.microsoft.com/office/drawing/2014/main" id="{D88B917D-F15D-482F-8118-8D74A068EDC4}"/>
+              </a:ext>
+            </a:extLst>
+          </p:cNvPr>
+          <p:cNvSpPr/>
+          <p:nvPr/>
+        </p:nvSpPr>
+        <p:spPr>
+          <a:xfrm>
+            <a:off x="2341978" y="4317586"/>
+            <a:ext cx="759980" cy="759980"/>
+          </a:xfrm>
+          <a:prstGeom prst="ellipse">
+            <a:avLst/>
+          </a:prstGeom>
+          <a:solidFill>
+            <a:srgbClr val="00B0F0"/>
+          </a:solidFill>
+          <a:ln w="28575"/>
+        </p:spPr>
+        <p:style>
+          <a:lnRef idx="2">
+            <a:schemeClr val="dk1"/>
+          </a:lnRef>
+          <a:fillRef idx="1">
+            <a:schemeClr val="lt1"/>
+          </a:fillRef>
+          <a:effectRef idx="0">
+            <a:schemeClr val="dk1"/>
+          </a:effectRef>
+          <a:fontRef idx="minor">
+            <a:schemeClr val="dk1"/>
+          </a:fontRef>
+        </p:style>
+        <p:txBody>
+          <a:bodyPr rtlCol="0" anchor="ctr"/>
+          <a:lstStyle/>
+          <a:p>
+            <a:pPr algn="ctr"/>
+            <a:endParaRPr lang="en-US" dirty="0"/>
+          </a:p>
+        </p:txBody>
+      </p:sp>
+      <p:sp>
+        <p:nvSpPr>
+          <p:cNvPr id="8" name="Multiplication Sign 7">
+            <a:extLst>
+              <a:ext uri="{FF2B5EF4-FFF2-40B4-BE49-F238E27FC236}">
+                <a16:creationId xmlns:a16="http://schemas.microsoft.com/office/drawing/2014/main" id="{170BA9B8-6E2D-47CF-9175-D432A52EC013}"/>
+              </a:ext>
+            </a:extLst>
+          </p:cNvPr>
+          <p:cNvSpPr/>
+          <p:nvPr/>
+        </p:nvSpPr>
+        <p:spPr>
+          <a:xfrm>
+            <a:off x="2224208" y="4199816"/>
+            <a:ext cx="995519" cy="995519"/>
+          </a:xfrm>
+          <a:prstGeom prst="mathMultiply">
+            <a:avLst>
+              <a:gd name="adj1" fmla="val 13905"/>
+            </a:avLst>
+          </a:prstGeom>
+          <a:solidFill>
+            <a:schemeClr val="tx1"/>
+          </a:solidFill>
+          <a:ln w="28575">
+            <a:noFill/>
+          </a:ln>
+        </p:spPr>
+        <p:style>
+          <a:lnRef idx="2">
+            <a:schemeClr val="accent1">
+              <a:shade val="50000"/>
+            </a:schemeClr>
+          </a:lnRef>
+          <a:fillRef idx="1">
+            <a:schemeClr val="accent1"/>
+          </a:fillRef>
+          <a:effectRef idx="0">
+            <a:schemeClr val="accent1"/>
+          </a:effectRef>
+          <a:fontRef idx="minor">
+            <a:schemeClr val="lt1"/>
+          </a:fontRef>
+        </p:style>
+        <p:txBody>
+          <a:bodyPr rtlCol="0" anchor="ctr"/>
+          <a:lstStyle/>
+          <a:p>
+            <a:pPr algn="ctr"/>
+            <a:endParaRPr lang="en-US"/>
+          </a:p>
+        </p:txBody>
+      </p:sp>
+      <p:sp>
+        <p:nvSpPr>
+          <p:cNvPr id="21" name="Rectangle 20">
+            <a:extLst>
+              <a:ext uri="{FF2B5EF4-FFF2-40B4-BE49-F238E27FC236}">
+                <a16:creationId xmlns:a16="http://schemas.microsoft.com/office/drawing/2014/main" id="{058B35CA-1537-472D-A349-7949934C2E92}"/>
+              </a:ext>
+            </a:extLst>
+          </p:cNvPr>
+          <p:cNvSpPr/>
+          <p:nvPr/>
+        </p:nvSpPr>
+        <p:spPr>
+          <a:xfrm>
+            <a:off x="4129180" y="4106788"/>
+            <a:ext cx="995519" cy="995519"/>
+          </a:xfrm>
+          <a:prstGeom prst="rect">
+            <a:avLst/>
+          </a:prstGeom>
+          <a:noFill/>
+          <a:ln w="28575">
+            <a:noFill/>
+          </a:ln>
+        </p:spPr>
+        <p:style>
+          <a:lnRef idx="2">
+            <a:schemeClr val="accent1">
+              <a:shade val="50000"/>
+            </a:schemeClr>
+          </a:lnRef>
+          <a:fillRef idx="1">
+            <a:schemeClr val="accent1"/>
+          </a:fillRef>
+          <a:effectRef idx="0">
+            <a:schemeClr val="accent1"/>
+          </a:effectRef>
+          <a:fontRef idx="minor">
+            <a:schemeClr val="lt1"/>
+          </a:fontRef>
+        </p:style>
+        <p:txBody>
+          <a:bodyPr rtlCol="0" anchor="ctr"/>
+          <a:lstStyle/>
+          <a:p>
+            <a:pPr algn="ctr"/>
+            <a:endParaRPr lang="en-US"/>
+          </a:p>
+        </p:txBody>
+      </p:sp>
+      <p:sp>
+        <p:nvSpPr>
+          <p:cNvPr id="22" name="Oval 21">
+            <a:extLst>
+              <a:ext uri="{FF2B5EF4-FFF2-40B4-BE49-F238E27FC236}">
+                <a16:creationId xmlns:a16="http://schemas.microsoft.com/office/drawing/2014/main" id="{74B310BB-AC17-45A4-A3D6-EEFA11256879}"/>
+              </a:ext>
+            </a:extLst>
+          </p:cNvPr>
+          <p:cNvSpPr/>
+          <p:nvPr/>
+        </p:nvSpPr>
+        <p:spPr>
+          <a:xfrm>
+            <a:off x="4256043" y="4212187"/>
+            <a:ext cx="759980" cy="759980"/>
+          </a:xfrm>
+          <a:prstGeom prst="ellipse">
+            <a:avLst/>
+          </a:prstGeom>
+          <a:solidFill>
+            <a:srgbClr val="00B0F0"/>
+          </a:solidFill>
+          <a:ln w="28575"/>
+        </p:spPr>
+        <p:style>
+          <a:lnRef idx="2">
+            <a:schemeClr val="dk1"/>
+          </a:lnRef>
+          <a:fillRef idx="1">
+            <a:schemeClr val="lt1"/>
+          </a:fillRef>
+          <a:effectRef idx="0">
+            <a:schemeClr val="dk1"/>
+          </a:effectRef>
+          <a:fontRef idx="minor">
+            <a:schemeClr val="dk1"/>
+          </a:fontRef>
+        </p:style>
+        <p:txBody>
+          <a:bodyPr rtlCol="0" anchor="ctr"/>
+          <a:lstStyle/>
+          <a:p>
+            <a:pPr algn="ctr"/>
+            <a:endParaRPr lang="en-US" dirty="0"/>
+          </a:p>
+        </p:txBody>
+      </p:sp>
+      <p:sp>
+        <p:nvSpPr>
+          <p:cNvPr id="23" name="Rectangle 22">
+            <a:extLst>
+              <a:ext uri="{FF2B5EF4-FFF2-40B4-BE49-F238E27FC236}">
+                <a16:creationId xmlns:a16="http://schemas.microsoft.com/office/drawing/2014/main" id="{741BF11D-DA30-4E91-A1DF-0ED558F893D1}"/>
+              </a:ext>
+            </a:extLst>
+          </p:cNvPr>
+          <p:cNvSpPr/>
+          <p:nvPr/>
+        </p:nvSpPr>
+        <p:spPr>
+          <a:xfrm rot="18900000">
+            <a:off x="4178418" y="4811400"/>
+            <a:ext cx="362184" cy="123324"/>
+          </a:xfrm>
+          <a:prstGeom prst="rect">
+            <a:avLst/>
+          </a:prstGeom>
+          <a:solidFill>
+            <a:schemeClr val="tx1"/>
+          </a:solidFill>
+          <a:ln w="28575"/>
+        </p:spPr>
+        <p:style>
+          <a:lnRef idx="2">
+            <a:schemeClr val="dk1"/>
+          </a:lnRef>
+          <a:fillRef idx="1">
+            <a:schemeClr val="lt1"/>
+          </a:fillRef>
+          <a:effectRef idx="0">
+            <a:schemeClr val="dk1"/>
+          </a:effectRef>
+          <a:fontRef idx="minor">
+            <a:schemeClr val="dk1"/>
+          </a:fontRef>
+        </p:style>
+        <p:txBody>
+          <a:bodyPr rtlCol="0" anchor="ctr"/>
+          <a:lstStyle/>
+          <a:p>
+            <a:pPr algn="ctr"/>
+            <a:endParaRPr lang="en-US"/>
+          </a:p>
+        </p:txBody>
+      </p:sp>
+      <p:sp>
+        <p:nvSpPr>
+          <p:cNvPr id="24" name="Oval 23">
+            <a:extLst>
+              <a:ext uri="{FF2B5EF4-FFF2-40B4-BE49-F238E27FC236}">
+                <a16:creationId xmlns:a16="http://schemas.microsoft.com/office/drawing/2014/main" id="{5FDD6F91-AD86-4432-A0C5-2C9B40FA55ED}"/>
+              </a:ext>
+            </a:extLst>
+          </p:cNvPr>
+          <p:cNvSpPr/>
+          <p:nvPr/>
+        </p:nvSpPr>
+        <p:spPr>
+          <a:xfrm>
+            <a:off x="4404880" y="4363576"/>
+            <a:ext cx="457202" cy="457202"/>
+          </a:xfrm>
+          <a:prstGeom prst="ellipse">
+            <a:avLst/>
+          </a:prstGeom>
+          <a:solidFill>
+            <a:schemeClr val="tx1"/>
+          </a:solidFill>
+          <a:ln w="28575"/>
+        </p:spPr>
+        <p:style>
+          <a:lnRef idx="2">
+            <a:schemeClr val="dk1"/>
+          </a:lnRef>
+          <a:fillRef idx="1">
+            <a:schemeClr val="lt1"/>
+          </a:fillRef>
+          <a:effectRef idx="0">
+            <a:schemeClr val="dk1"/>
+          </a:effectRef>
+          <a:fontRef idx="minor">
+            <a:schemeClr val="dk1"/>
+          </a:fontRef>
+        </p:style>
+        <p:txBody>
+          <a:bodyPr rtlCol="0" anchor="ctr"/>
+          <a:lstStyle/>
+          <a:p>
+            <a:pPr algn="ctr"/>
+            <a:endParaRPr lang="en-US"/>
+          </a:p>
+        </p:txBody>
+      </p:sp>
+      <p:sp>
+        <p:nvSpPr>
+          <p:cNvPr id="11" name="Hexagon 10">
+            <a:extLst>
+              <a:ext uri="{FF2B5EF4-FFF2-40B4-BE49-F238E27FC236}">
+                <a16:creationId xmlns:a16="http://schemas.microsoft.com/office/drawing/2014/main" id="{BB6BBDF1-BDBC-4D9E-A08C-823F5DFBEE3C}"/>
+              </a:ext>
+            </a:extLst>
+          </p:cNvPr>
+          <p:cNvSpPr/>
+          <p:nvPr/>
+        </p:nvSpPr>
+        <p:spPr>
+          <a:xfrm rot="18900000">
+            <a:off x="4536600" y="4361984"/>
+            <a:ext cx="379831" cy="269214"/>
+          </a:xfrm>
+          <a:prstGeom prst="hexagon">
+            <a:avLst/>
+          </a:prstGeom>
+          <a:solidFill>
+            <a:srgbClr val="00B0F0"/>
+          </a:solidFill>
+          <a:ln>
+            <a:noFill/>
+          </a:ln>
+        </p:spPr>
+        <p:style>
+          <a:lnRef idx="2">
+            <a:schemeClr val="accent1">
+              <a:shade val="50000"/>
+            </a:schemeClr>
+          </a:lnRef>
+          <a:fillRef idx="1">
+            <a:schemeClr val="accent1"/>
+          </a:fillRef>
+          <a:effectRef idx="0">
+            <a:schemeClr val="accent1"/>
+          </a:effectRef>
+          <a:fontRef idx="minor">
+            <a:schemeClr val="lt1"/>
           </a:fontRef>
         </p:style>
         <p:txBody>

</xml_diff>